<commit_message>
fix typo so lambda is on betas; closes #22 finally
</commit_message>
<xml_diff>
--- a/10-linear_py/slides.pptx
+++ b/10-linear_py/slides.pptx
@@ -13504,7 +13504,7 @@
               <a:t>|</a:t>
             </a:r>
             <a:r>
-              <a:rPr lang="en-US" sz="2500" spc="300" dirty="0">
+              <a:rPr lang="en-US" sz="2500" spc="300" dirty="0" smtClean="0">
                 <a:latin typeface="PFDinTextCompPro-Light"/>
                 <a:cs typeface="PFDinTextCompPro-Light"/>
               </a:rPr>
@@ -13512,13 +13512,13 @@
             </a:r>
             <a:r>
               <a:rPr lang="en-US" sz="2500" i="1" spc="300" dirty="0">
-                <a:latin typeface="+mn-lt"/>
-                <a:cs typeface="PFDinTextCompPro-Italic"/>
-              </a:rPr>
-              <a:t>x</a:t>
-            </a:r>
-            <a:r>
-              <a:rPr lang="en-US" sz="2500" dirty="0">
+                <a:latin typeface="Symbol" charset="2"/>
+                <a:cs typeface="Symbol" charset="2"/>
+              </a:rPr>
+              <a:t>b</a:t>
+            </a:r>
+            <a:r>
+              <a:rPr lang="en-US" sz="2500" dirty="0" smtClean="0">
                 <a:latin typeface="PFDinTextCompPro-Light"/>
                 <a:cs typeface="PFDinTextCompPro-Light"/>
               </a:rPr>
@@ -13651,7 +13651,7 @@
               <a:t>|</a:t>
             </a:r>
             <a:r>
-              <a:rPr lang="en-US" sz="2500" spc="300" dirty="0">
+              <a:rPr lang="en-US" sz="2500" spc="300" dirty="0" smtClean="0">
                 <a:latin typeface="PFDinTextCompPro-Light"/>
                 <a:cs typeface="PFDinTextCompPro-Light"/>
               </a:rPr>
@@ -13659,13 +13659,13 @@
             </a:r>
             <a:r>
               <a:rPr lang="en-US" sz="2500" i="1" spc="300" dirty="0">
-                <a:latin typeface="+mn-lt"/>
-                <a:cs typeface="PFDinTextCompPro-Italic"/>
-              </a:rPr>
-              <a:t>x</a:t>
-            </a:r>
-            <a:r>
-              <a:rPr lang="en-US" sz="2500" dirty="0">
+                <a:latin typeface="Symbol" charset="2"/>
+                <a:cs typeface="Symbol" charset="2"/>
+              </a:rPr>
+              <a:t>b</a:t>
+            </a:r>
+            <a:r>
+              <a:rPr lang="en-US" sz="2500" dirty="0" smtClean="0">
                 <a:latin typeface="PFDinTextCompPro-Light"/>
                 <a:cs typeface="PFDinTextCompPro-Light"/>
               </a:rPr>
@@ -13942,7 +13942,7 @@
               <a:t>|</a:t>
             </a:r>
             <a:r>
-              <a:rPr lang="en-US" sz="2500" spc="300" dirty="0">
+              <a:rPr lang="en-US" sz="2500" spc="300" dirty="0" smtClean="0">
                 <a:latin typeface="PFDinTextCompPro-Light"/>
                 <a:cs typeface="PFDinTextCompPro-Light"/>
               </a:rPr>
@@ -13950,13 +13950,13 @@
             </a:r>
             <a:r>
               <a:rPr lang="en-US" sz="2500" i="1" spc="300" dirty="0">
-                <a:latin typeface="+mn-lt"/>
-                <a:cs typeface="PFDinTextCompPro-Italic"/>
-              </a:rPr>
-              <a:t>x</a:t>
-            </a:r>
-            <a:r>
-              <a:rPr lang="en-US" sz="2500" dirty="0">
+                <a:latin typeface="Symbol" charset="2"/>
+                <a:cs typeface="Symbol" charset="2"/>
+              </a:rPr>
+              <a:t>b</a:t>
+            </a:r>
+            <a:r>
+              <a:rPr lang="en-US" sz="2500" dirty="0" smtClean="0">
                 <a:latin typeface="PFDinTextCompPro-Light"/>
                 <a:cs typeface="PFDinTextCompPro-Light"/>
               </a:rPr>
@@ -14089,7 +14089,7 @@
               <a:t>|</a:t>
             </a:r>
             <a:r>
-              <a:rPr lang="en-US" sz="2500" spc="300" dirty="0">
+              <a:rPr lang="en-US" sz="2500" spc="300" dirty="0" smtClean="0">
                 <a:latin typeface="PFDinTextCompPro-Light"/>
                 <a:cs typeface="PFDinTextCompPro-Light"/>
               </a:rPr>
@@ -14097,13 +14097,13 @@
             </a:r>
             <a:r>
               <a:rPr lang="en-US" sz="2500" i="1" spc="300" dirty="0">
-                <a:latin typeface="+mn-lt"/>
-                <a:cs typeface="PFDinTextCompPro-Italic"/>
-              </a:rPr>
-              <a:t>x</a:t>
-            </a:r>
-            <a:r>
-              <a:rPr lang="en-US" sz="2500" dirty="0">
+                <a:latin typeface="Symbol" charset="2"/>
+                <a:cs typeface="Symbol" charset="2"/>
+              </a:rPr>
+              <a:t>b</a:t>
+            </a:r>
+            <a:r>
+              <a:rPr lang="en-US" sz="2500" dirty="0" smtClean="0">
                 <a:latin typeface="PFDinTextCompPro-Light"/>
                 <a:cs typeface="PFDinTextCompPro-Light"/>
               </a:rPr>
@@ -14422,7 +14422,7 @@
               <a:t>|</a:t>
             </a:r>
             <a:r>
-              <a:rPr lang="en-US" sz="2500" spc="300" dirty="0">
+              <a:rPr lang="en-US" sz="2500" spc="300" dirty="0" smtClean="0">
                 <a:latin typeface="PFDinTextCompPro-Light"/>
                 <a:cs typeface="PFDinTextCompPro-Light"/>
               </a:rPr>
@@ -14430,13 +14430,13 @@
             </a:r>
             <a:r>
               <a:rPr lang="en-US" sz="2500" i="1" spc="300" dirty="0">
-                <a:latin typeface="+mn-lt"/>
-                <a:cs typeface="PFDinTextCompPro-Italic"/>
-              </a:rPr>
-              <a:t>x</a:t>
-            </a:r>
-            <a:r>
-              <a:rPr lang="en-US" sz="2500" dirty="0">
+                <a:latin typeface="Symbol" charset="2"/>
+                <a:cs typeface="Symbol" charset="2"/>
+              </a:rPr>
+              <a:t>b</a:t>
+            </a:r>
+            <a:r>
+              <a:rPr lang="en-US" sz="2500" dirty="0" smtClean="0">
                 <a:latin typeface="PFDinTextCompPro-Light"/>
                 <a:cs typeface="PFDinTextCompPro-Light"/>
               </a:rPr>
@@ -14569,7 +14569,7 @@
               <a:t>|</a:t>
             </a:r>
             <a:r>
-              <a:rPr lang="en-US" sz="2500" spc="300" dirty="0">
+              <a:rPr lang="en-US" sz="2500" spc="300" dirty="0" smtClean="0">
                 <a:latin typeface="PFDinTextCompPro-Light"/>
                 <a:cs typeface="PFDinTextCompPro-Light"/>
               </a:rPr>
@@ -14577,13 +14577,13 @@
             </a:r>
             <a:r>
               <a:rPr lang="en-US" sz="2500" i="1" spc="300" dirty="0">
-                <a:latin typeface="+mn-lt"/>
-                <a:cs typeface="PFDinTextCompPro-Italic"/>
-              </a:rPr>
-              <a:t>x</a:t>
-            </a:r>
-            <a:r>
-              <a:rPr lang="en-US" sz="2500" dirty="0">
+                <a:latin typeface="Symbol" charset="2"/>
+                <a:cs typeface="Symbol" charset="2"/>
+              </a:rPr>
+              <a:t>b</a:t>
+            </a:r>
+            <a:r>
+              <a:rPr lang="en-US" sz="2500" dirty="0" smtClean="0">
                 <a:latin typeface="PFDinTextCompPro-Light"/>
                 <a:cs typeface="PFDinTextCompPro-Light"/>
               </a:rPr>
@@ -16979,7 +16979,7 @@
               <a:t>|</a:t>
             </a:r>
             <a:r>
-              <a:rPr lang="en-US" sz="2500" spc="300" dirty="0">
+              <a:rPr lang="en-US" sz="2500" spc="300" dirty="0" smtClean="0">
                 <a:latin typeface="PFDinTextCompPro-Light"/>
                 <a:cs typeface="PFDinTextCompPro-Light"/>
               </a:rPr>
@@ -16987,12 +16987,13 @@
             </a:r>
             <a:r>
               <a:rPr lang="en-US" sz="2500" i="1" spc="300" dirty="0">
-                <a:cs typeface="PFDinTextCompPro-Italic"/>
-              </a:rPr>
-              <a:t>x</a:t>
-            </a:r>
-            <a:r>
-              <a:rPr lang="en-US" sz="2500" dirty="0">
+                <a:latin typeface="Symbol" charset="2"/>
+                <a:cs typeface="Symbol" charset="2"/>
+              </a:rPr>
+              <a:t>b</a:t>
+            </a:r>
+            <a:r>
+              <a:rPr lang="en-US" sz="2500" dirty="0" smtClean="0">
                 <a:latin typeface="PFDinTextCompPro-Light"/>
                 <a:cs typeface="PFDinTextCompPro-Light"/>
               </a:rPr>
@@ -17118,7 +17119,7 @@
               <a:t>|</a:t>
             </a:r>
             <a:r>
-              <a:rPr lang="en-US" sz="2500" spc="300" dirty="0">
+              <a:rPr lang="en-US" sz="2500" spc="300" dirty="0" smtClean="0">
                 <a:latin typeface="PFDinTextCompPro-Light"/>
                 <a:cs typeface="PFDinTextCompPro-Light"/>
               </a:rPr>
@@ -17126,19 +17127,20 @@
             </a:r>
             <a:r>
               <a:rPr lang="en-US" sz="2500" i="1" spc="300" dirty="0">
-                <a:cs typeface="PFDinTextCompPro-Italic"/>
-              </a:rPr>
-              <a:t>x</a:t>
-            </a:r>
-            <a:r>
-              <a:rPr lang="en-US" sz="2500" dirty="0">
+                <a:latin typeface="Symbol" charset="2"/>
+                <a:cs typeface="Symbol" charset="2"/>
+              </a:rPr>
+              <a:t>b</a:t>
+            </a:r>
+            <a:r>
+              <a:rPr lang="en-US" sz="2500" dirty="0" smtClean="0">
                 <a:latin typeface="PFDinTextCompPro-Light"/>
                 <a:cs typeface="PFDinTextCompPro-Light"/>
               </a:rPr>
               <a:t>|</a:t>
             </a:r>
             <a:r>
-              <a:rPr lang="en-US" sz="2500" spc="300" dirty="0">
+              <a:rPr lang="en-US" sz="2500" spc="300" dirty="0" smtClean="0">
                 <a:latin typeface="PFDinTextCompPro-Light"/>
                 <a:cs typeface="PFDinTextCompPro-Light"/>
               </a:rPr>
@@ -17497,7 +17499,7 @@
               <a:t>|</a:t>
             </a:r>
             <a:r>
-              <a:rPr lang="en-US" sz="2500" spc="300" dirty="0">
+              <a:rPr lang="en-US" sz="2500" spc="300" dirty="0" smtClean="0">
                 <a:latin typeface="PFDinTextCompPro-Light"/>
                 <a:cs typeface="PFDinTextCompPro-Light"/>
               </a:rPr>
@@ -17505,12 +17507,13 @@
             </a:r>
             <a:r>
               <a:rPr lang="en-US" sz="2500" i="1" spc="300" dirty="0">
-                <a:cs typeface="PFDinTextCompPro-Italic"/>
-              </a:rPr>
-              <a:t>x</a:t>
-            </a:r>
-            <a:r>
-              <a:rPr lang="en-US" sz="2500" dirty="0">
+                <a:latin typeface="Symbol" charset="2"/>
+                <a:cs typeface="Symbol" charset="2"/>
+              </a:rPr>
+              <a:t>b</a:t>
+            </a:r>
+            <a:r>
+              <a:rPr lang="en-US" sz="2500" dirty="0" smtClean="0">
                 <a:latin typeface="PFDinTextCompPro-Light"/>
                 <a:cs typeface="PFDinTextCompPro-Light"/>
               </a:rPr>
@@ -17636,7 +17639,7 @@
               <a:t>|</a:t>
             </a:r>
             <a:r>
-              <a:rPr lang="en-US" sz="2500" spc="300" dirty="0">
+              <a:rPr lang="en-US" sz="2500" spc="300" dirty="0" smtClean="0">
                 <a:latin typeface="PFDinTextCompPro-Light"/>
                 <a:cs typeface="PFDinTextCompPro-Light"/>
               </a:rPr>
@@ -17644,12 +17647,13 @@
             </a:r>
             <a:r>
               <a:rPr lang="en-US" sz="2500" i="1" spc="300" dirty="0">
-                <a:cs typeface="PFDinTextCompPro-Italic"/>
-              </a:rPr>
-              <a:t>x</a:t>
-            </a:r>
-            <a:r>
-              <a:rPr lang="en-US" sz="2500" dirty="0">
+                <a:latin typeface="Symbol" charset="2"/>
+                <a:cs typeface="Symbol" charset="2"/>
+              </a:rPr>
+              <a:t>b</a:t>
+            </a:r>
+            <a:r>
+              <a:rPr lang="en-US" sz="2500" dirty="0" smtClean="0">
                 <a:latin typeface="PFDinTextCompPro-Light"/>
                 <a:cs typeface="PFDinTextCompPro-Light"/>
               </a:rPr>

</xml_diff>